<commit_message>
Update slide notes and module number
</commit_message>
<xml_diff>
--- a/Slides/Module 02 From Requirements to Tests.pptx
+++ b/Slides/Module 02 From Requirements to Tests.pptx
@@ -3703,7 +3703,7 @@
           <a:p>
             <a:fld id="{7C7E5181-6CF5-45F7-A87A-E0E0B1FD7549}" type="datetimeFigureOut">
               <a:rPr lang="en-US" smtClean="0"/>
-              <a:t>12/20/25</a:t>
+              <a:t>12/26/25</a:t>
             </a:fld>
             <a:endParaRPr lang="en-US"/>
           </a:p>
@@ -4373,7 +4373,15 @@
             </a:pPr>
             <a:r>
               <a:rPr lang="en-US" dirty="0"/>
-              <a:t>Identify the stakeholders and value tensions. For e.g., the stakeholders here could be site users and site owners. Their interests may align or conflict. For e.g., site users may want to be anonymous, but site owners might want to monetize site usage by sharing personal usage data with advertisers. On the other hand they may align if the site owners want to make accountability and transparently a core value of their operations.</a:t>
+              <a:t>Identify the stakeholders and value tensions. For e.g., the stakeholders here could be site users and site owners. Their interests may align or conflict. For e.g., site users may want to be anonymous, but site owners might want to monetize site usage by sharing personal usage data with advertisers. On the </a:t>
+            </a:r>
+            <a:r>
+              <a:rPr lang="en-US"/>
+              <a:t>other hand, </a:t>
+            </a:r>
+            <a:r>
+              <a:rPr lang="en-US" dirty="0"/>
+              <a:t>they may align if the site owners want to make accountability and transparently a core value of their operations.</a:t>
             </a:r>
           </a:p>
           <a:p>
@@ -6658,7 +6666,7 @@
           <a:p>
             <a:r>
               <a:rPr lang="en-US" dirty="0"/>
-              <a:t>This is a refinement of the way we introduced user stories. </a:t>
+              <a:t>This lecture is providing a bigger picture for the context of user stories in software engineering.</a:t>
             </a:r>
           </a:p>
           <a:p>
@@ -6667,7 +6675,7 @@
           <a:p>
             <a:r>
               <a:rPr lang="en-US" dirty="0"/>
-              <a:t>x-Driven Design and other ways of capturing requirements help us understand and communicate what we’re planning to do.</a:t>
+              <a:t>Connecting the actual needs of people to user stories is the role of ”whatever-Driven Design” and other ways of capturing requirements. We use user stories to help us understand and communicate what we’re planning to do.</a:t>
             </a:r>
           </a:p>
           <a:p>
@@ -6685,7 +6693,7 @@
           <a:p>
             <a:r>
               <a:rPr lang="en-US" dirty="0"/>
-              <a:t>This lecture starts with requirements analysis and ends with test-driven development: the way we ensure our conditions of satisfaction are connected to </a:t>
+              <a:t>Connecting conditions of satisfaction to the code we’re running through the practice of test-driven development is how we make sure all our organizing and planning is reflected in what we ultimately create.</a:t>
             </a:r>
           </a:p>
         </p:txBody>
@@ -6879,7 +6887,7 @@
           <a:p>
             <a:r>
               <a:rPr lang="en-US" i="0" dirty="0"/>
-              <a:t>- We’re going to talk about test-driven development, and how it connects our conditions of satisfaction to our actual code</a:t>
+              <a:t> - We’re going to talk about test-driven development, and how it connects our conditions of satisfaction to our actual code</a:t>
             </a:r>
             <a:endParaRPr lang="en-US" dirty="0"/>
           </a:p>
@@ -7658,7 +7666,7 @@
           <a:p>
             <a:fld id="{5D2A64DE-480B-420F-9649-4F8E696E08E0}" type="datetime1">
               <a:rPr lang="en-US" smtClean="0"/>
-              <a:t>12/20/25</a:t>
+              <a:t>12/26/25</a:t>
             </a:fld>
             <a:endParaRPr lang="en-US"/>
           </a:p>
@@ -7982,7 +7990,7 @@
           <a:p>
             <a:fld id="{EA476A42-A091-4468-A075-64A31BE59948}" type="datetime1">
               <a:rPr lang="en-US" smtClean="0"/>
-              <a:t>12/20/25</a:t>
+              <a:t>12/26/25</a:t>
             </a:fld>
             <a:endParaRPr lang="en-US"/>
           </a:p>
@@ -8180,7 +8188,7 @@
           <a:p>
             <a:fld id="{0D3616D0-8311-4107-9726-6B805E7D05BA}" type="datetime1">
               <a:rPr lang="en-US" smtClean="0"/>
-              <a:t>12/20/25</a:t>
+              <a:t>12/26/25</a:t>
             </a:fld>
             <a:endParaRPr lang="en-US"/>
           </a:p>
@@ -8388,7 +8396,7 @@
           <a:p>
             <a:fld id="{3BC2557A-5C88-417A-A763-5AC779462A5F}" type="datetime1">
               <a:rPr lang="en-US" smtClean="0"/>
-              <a:t>12/20/25</a:t>
+              <a:t>12/26/25</a:t>
             </a:fld>
             <a:endParaRPr lang="en-US"/>
           </a:p>
@@ -8810,7 +8818,7 @@
           <a:p>
             <a:fld id="{07C7BFD4-467E-4EDE-93EA-052F5B39A4E5}" type="datetime1">
               <a:rPr lang="en-US" smtClean="0"/>
-              <a:t>12/20/25</a:t>
+              <a:t>12/26/25</a:t>
             </a:fld>
             <a:endParaRPr lang="en-US"/>
           </a:p>
@@ -9060,7 +9068,7 @@
           <a:p>
             <a:fld id="{07C7BFD4-467E-4EDE-93EA-052F5B39A4E5}" type="datetime1">
               <a:rPr lang="en-US" smtClean="0"/>
-              <a:t>12/20/25</a:t>
+              <a:t>12/26/25</a:t>
             </a:fld>
             <a:endParaRPr lang="en-US"/>
           </a:p>
@@ -9242,7 +9250,7 @@
           <a:p>
             <a:fld id="{109E55A0-C911-4F03-82FC-7E5926047D46}" type="datetime1">
               <a:rPr lang="en-US" smtClean="0"/>
-              <a:t>12/20/25</a:t>
+              <a:t>12/26/25</a:t>
             </a:fld>
             <a:endParaRPr lang="en-US"/>
           </a:p>
@@ -9555,7 +9563,7 @@
           <a:p>
             <a:fld id="{A533CBE2-D5BE-47AC-ADC2-9CDFC1D0CF90}" type="datetime1">
               <a:rPr lang="en-US" smtClean="0"/>
-              <a:t>12/20/25</a:t>
+              <a:t>12/26/25</a:t>
             </a:fld>
             <a:endParaRPr lang="en-US"/>
           </a:p>
@@ -9856,7 +9864,7 @@
           <a:p>
             <a:fld id="{39B7EDB1-CE74-4951-85A2-0B01C2128E28}" type="datetime1">
               <a:rPr lang="en-US" smtClean="0"/>
-              <a:t>12/20/25</a:t>
+              <a:t>12/26/25</a:t>
             </a:fld>
             <a:endParaRPr lang="en-US"/>
           </a:p>
@@ -10304,7 +10312,7 @@
           <a:p>
             <a:fld id="{2BC7EB92-A5C2-4807-A9DC-9EDE6CBFB241}" type="datetime1">
               <a:rPr lang="en-US" smtClean="0"/>
-              <a:t>12/20/25</a:t>
+              <a:t>12/26/25</a:t>
             </a:fld>
             <a:endParaRPr lang="en-US"/>
           </a:p>
@@ -10417,7 +10425,7 @@
           <a:p>
             <a:fld id="{2B7B7EE0-7771-4CD5-9B2B-3550753A54A1}" type="datetime1">
               <a:rPr lang="en-US" smtClean="0"/>
-              <a:t>12/20/25</a:t>
+              <a:t>12/26/25</a:t>
             </a:fld>
             <a:endParaRPr lang="en-US"/>
           </a:p>
@@ -10728,7 +10736,7 @@
           <a:p>
             <a:fld id="{F8B318B3-0E87-4416-A9B8-D891968C2727}" type="datetime1">
               <a:rPr lang="en-US" smtClean="0"/>
-              <a:t>12/20/25</a:t>
+              <a:t>12/26/25</a:t>
             </a:fld>
             <a:endParaRPr lang="en-US"/>
           </a:p>
@@ -10969,7 +10977,7 @@
           <a:p>
             <a:fld id="{54D997E8-DDEE-43F1-8D9B-F8A1E11DE488}" type="datetime1">
               <a:rPr lang="en-US" smtClean="0"/>
-              <a:t>12/20/25</a:t>
+              <a:t>12/26/25</a:t>
             </a:fld>
             <a:endParaRPr lang="en-US"/>
           </a:p>
@@ -11427,7 +11435,7 @@
               <a:rPr lang="en-US" altLang="en-US" dirty="0">
                 <a:sym typeface="Helvetica Neue" charset="0"/>
               </a:rPr>
-              <a:t>Module 1.2: From Requirements to Tests</a:t>
+              <a:t>Module 2: From Requirements to Tests</a:t>
             </a:r>
             <a:endParaRPr lang="en-US" sz="3200" dirty="0"/>
           </a:p>
@@ -11563,6 +11571,65 @@
               <a:t> license</a:t>
             </a:r>
             <a:endParaRPr lang="en-US" dirty="0"/>
+          </a:p>
+        </p:txBody>
+      </p:sp>
+      <p:sp>
+        <p:nvSpPr>
+          <p:cNvPr id="5" name="TextBox 4">
+            <a:extLst>
+              <a:ext uri="{FF2B5EF4-FFF2-40B4-BE49-F238E27FC236}">
+                <a16:creationId xmlns:a16="http://schemas.microsoft.com/office/drawing/2014/main" id="{E2CC67B2-D054-4205-15E3-D9ECBB15CFBA}"/>
+              </a:ext>
+            </a:extLst>
+          </p:cNvPr>
+          <p:cNvSpPr txBox="1"/>
+          <p:nvPr/>
+        </p:nvSpPr>
+        <p:spPr>
+          <a:xfrm>
+            <a:off x="-3002692" y="4003589"/>
+            <a:ext cx="0" cy="0"/>
+          </a:xfrm>
+          <a:prstGeom prst="rect">
+            <a:avLst/>
+          </a:prstGeom>
+          <a:noFill/>
+          <a:ln>
+            <a:noFill/>
+          </a:ln>
+        </p:spPr>
+        <p:style>
+          <a:lnRef idx="2">
+            <a:schemeClr val="accent1">
+              <a:shade val="50000"/>
+            </a:schemeClr>
+          </a:lnRef>
+          <a:fillRef idx="1">
+            <a:schemeClr val="accent1"/>
+          </a:fillRef>
+          <a:effectRef idx="0">
+            <a:schemeClr val="accent1"/>
+          </a:effectRef>
+          <a:fontRef idx="minor">
+            <a:schemeClr val="lt1"/>
+          </a:fontRef>
+        </p:style>
+        <p:txBody>
+          <a:bodyPr rot="0" spcFirstLastPara="0" vertOverflow="overflow" horzOverflow="overflow" vert="horz" wrap="none" lIns="91440" tIns="45720" rIns="91440" bIns="45720" numCol="1" spcCol="0" rtlCol="0" fromWordArt="0" anchor="ctr" anchorCtr="0" forceAA="0" compatLnSpc="1">
+            <a:prstTxWarp prst="textNoShape">
+              <a:avLst/>
+            </a:prstTxWarp>
+            <a:noAutofit/>
+          </a:bodyPr>
+          <a:lstStyle/>
+          <a:p>
+            <a:pPr algn="l"/>
+            <a:endParaRPr lang="en-US" dirty="0">
+              <a:solidFill>
+                <a:schemeClr val="tx1"/>
+              </a:solidFill>
+            </a:endParaRPr>
           </a:p>
         </p:txBody>
       </p:sp>
@@ -11969,7 +12036,13 @@
           <a:p>
             <a:r>
               <a:rPr lang="en-US" dirty="0"/>
-              <a:t>Value Sensitive Design (VSD) is one framework recommends paying special attention to </a:t>
+              <a:t>Value Sensitive Design (VSD) is one framework (of many!)</a:t>
+            </a:r>
+          </a:p>
+          <a:p>
+            <a:r>
+              <a:rPr lang="en-US" dirty="0"/>
+              <a:t>VSD guides designers and engineers to pay special attention to </a:t>
             </a:r>
             <a:r>
               <a:rPr lang="en-US" b="1" dirty="0"/>

</xml_diff>